<commit_message>
Clean up PDF, create asciidoc
</commit_message>
<xml_diff>
--- a/DSE5002_prjt1_cbrookshier.pptx
+++ b/DSE5002_prjt1_cbrookshier.pptx
@@ -513,11 +513,19 @@
           <a:p>
             <a:r>
               <a:rPr lang="en-US" sz="1800" dirty="0"/>
-              <a:t>Analysis of  the original dataset compared to a more current data set indicates a marked difference between the Interquartile range (IGR) of salaries.  When filtered for job titles with the word ‘lead’, the interquartile range (25% to 75%) percentiles change from a range of approximately 87,000 to 170,000 USD in the 2020-2022 set to a range of 111,000 to 182,000 USD in the 2025 filtered set. </a:t>
+              <a:t>All data filtered to reflect salary ranges with the word ‘lead’ included in the job title. Analysis of  the </a:t>
+            </a:r>
+            <a:r>
+              <a:rPr lang="en-US" sz="2800" dirty="0"/>
+              <a:t>provided dataset </a:t>
+            </a:r>
+            <a:r>
+              <a:rPr lang="en-US" sz="1800" dirty="0"/>
+              <a:t>compared to a more current data set indicates a marked difference between the Interquartile range of ‘lead’ filtered salaries.  The interquartile range (25% to 75%) percentiles change from a range of 87,000 to 170,000 USD in the 2020-2022 set, to a range of 111,000 to 182,000 USD in the 2025 filtered set. </a:t>
             </a:r>
           </a:p>
           <a:p>
-            <a:endParaRPr lang="en-US" sz="1800" dirty="0"/>
+            <a:endParaRPr lang="en-US" sz="2800" dirty="0"/>
           </a:p>
           <a:p>
             <a:r>
@@ -20679,7 +20687,7 @@
         <p:spPr>
           <a:xfrm>
             <a:off x="1552576" y="14287"/>
-            <a:ext cx="9115424" cy="687389"/>
+            <a:ext cx="9115424" cy="622263"/>
           </a:xfrm>
         </p:spPr>
         <p:txBody>
@@ -26014,8 +26022,8 @@
         </p:nvSpPr>
         <p:spPr>
           <a:xfrm>
-            <a:off x="628655" y="4230629"/>
-            <a:ext cx="10915645" cy="2862322"/>
+            <a:off x="828676" y="4230629"/>
+            <a:ext cx="10444161" cy="2800767"/>
           </a:xfrm>
           <a:prstGeom prst="rect">
             <a:avLst/>
@@ -26028,23 +26036,28 @@
           </a:bodyPr>
           <a:lstStyle/>
           <a:p>
+            <a:pPr marL="285750" indent="-285750">
+              <a:buFont typeface="Arial" panose="020B0604020202020204" pitchFamily="34" charset="0"/>
+              <a:buChar char="•"/>
+            </a:pPr>
             <a:r>
-              <a:rPr lang="en-US" sz="1800" dirty="0"/>
-              <a:t>All data filtered to reflect salary ranges with the word ‘lead’ included in the job title. Analysis of  the </a:t>
+              <a:rPr lang="en-US" sz="1700" dirty="0"/>
+              <a:t>All data filtered to reflect salary ranges with the word ‘lead’ included in the job title. Analysis of  the provided dataset compared to a more current data set indicates a marked difference between the Interquartile range of ‘lead’ filtered salaries.  The interquartile range (25% to 75%) percentiles change from a range of 87,000 to 170,000 USD in the 2020-2022 set, to a range of 111,000 to 182,000 USD in the 2025 filtered set. </a:t>
             </a:r>
-            <a:r>
-              <a:rPr lang="en-US" dirty="0"/>
-              <a:t>original provided dataset </a:t>
-            </a:r>
-            <a:r>
-              <a:rPr lang="en-US" sz="1800" dirty="0"/>
-              <a:t>compared to a more current data set indicates a marked difference between the Interquartile range of ‘lead’ filtered salaries.  The interquartile range (25% to 75%) percentiles change from a range of 87,000 to 170,000 USD in the 2020-2022 set to a range of 111,000 to 182,000 USD in the 2025 filtered set. </a:t>
-            </a:r>
+            <a:endParaRPr lang="en-US" sz="2800" dirty="0"/>
           </a:p>
           <a:p>
-            <a:endParaRPr lang="en-US" dirty="0"/>
+            <a:pPr marL="285750" indent="-285750">
+              <a:buFont typeface="Arial" panose="020B0604020202020204" pitchFamily="34" charset="0"/>
+              <a:buChar char="•"/>
+            </a:pPr>
+            <a:endParaRPr lang="en-US" sz="1800" dirty="0"/>
           </a:p>
           <a:p>
+            <a:pPr marL="285750" indent="-285750">
+              <a:buFont typeface="Arial" panose="020B0604020202020204" pitchFamily="34" charset="0"/>
+              <a:buChar char="•"/>
+            </a:pPr>
             <a:r>
               <a:rPr lang="en-US" sz="1800" dirty="0"/>
               <a:t>Both the original data set and the current set showed a substantive overall difference in ‘lead’ filtered salary ranges between US and non-US filtered subsets. The IQR for the 2025 set indicated a salary range of approximately 115,000 to 188,000 USD for US data scientists and an IQR of 61,000 to 103,000 USD for the non-US data scientist equivalent. </a:t>
@@ -32640,8 +32653,8 @@
         </p:nvSpPr>
         <p:spPr>
           <a:xfrm>
-            <a:off x="1141412" y="1125538"/>
-            <a:ext cx="9905999" cy="5480050"/>
+            <a:off x="735013" y="1125538"/>
+            <a:ext cx="10787061" cy="5480050"/>
           </a:xfrm>
         </p:spPr>
         <p:txBody>
@@ -32666,7 +32679,7 @@
                   </a:glow>
                 </a:effectLst>
               </a:rPr>
-              <a:t>To gain a data Scientist with leadership Ability, it is recommended that to remain competitive in the 2025 US market, the offered salary range should fall between </a:t>
+              <a:t>To Attract a data Scientist with leadership Ability, it is recommended that to remain competitive in the 2025 US market, the offered salary range should fall between         </a:t>
             </a:r>
             <a:r>
               <a:rPr lang="en-US" sz="1900" u="sng" dirty="0">

</xml_diff>